<commit_message>
Arrumado a escrita da apresentação
</commit_message>
<xml_diff>
--- a/ApresentacaoProjetoIndividual.pptx
+++ b/ApresentacaoProjetoIndividual.pptx
@@ -16365,13 +16365,13 @@
   <p:clrMapOvr>
     <a:masterClrMapping/>
   </p:clrMapOvr>
-  <mc:AlternateContent xmlns:mc="http://schemas.openxmlformats.org/markup-compatibility/2006">
-    <mc:Choice xmlns:p159="http://schemas.microsoft.com/office/powerpoint/2015/09/main" Requires="p159">
+  <mc:AlternateContent xmlns:mc="http://schemas.openxmlformats.org/markup-compatibility/2006" xmlns:p159="http://schemas.microsoft.com/office/powerpoint/2015/09/main">
+    <mc:Choice Requires="p159">
       <p:transition xmlns:p14="http://schemas.microsoft.com/office/powerpoint/2010/main" spd="slow" p14:dur="2000">
         <p159:morph option="byObject"/>
       </p:transition>
     </mc:Choice>
-    <mc:Fallback>
+    <mc:Fallback xmlns="">
       <p:transition spd="slow">
         <p:fade/>
       </p:transition>
@@ -18169,13 +18169,13 @@
   <p:clrMapOvr>
     <a:masterClrMapping/>
   </p:clrMapOvr>
-  <mc:AlternateContent xmlns:mc="http://schemas.openxmlformats.org/markup-compatibility/2006">
-    <mc:Choice xmlns:p159="http://schemas.microsoft.com/office/powerpoint/2015/09/main" Requires="p159">
+  <mc:AlternateContent xmlns:mc="http://schemas.openxmlformats.org/markup-compatibility/2006" xmlns:p159="http://schemas.microsoft.com/office/powerpoint/2015/09/main">
+    <mc:Choice Requires="p159">
       <p:transition xmlns:p14="http://schemas.microsoft.com/office/powerpoint/2010/main" spd="slow" p14:dur="2000">
         <p159:morph option="byObject"/>
       </p:transition>
     </mc:Choice>
-    <mc:Fallback>
+    <mc:Fallback xmlns="">
       <p:transition spd="slow">
         <p:fade/>
       </p:transition>
@@ -18618,13 +18618,13 @@
   <p:clrMapOvr>
     <a:masterClrMapping/>
   </p:clrMapOvr>
-  <mc:AlternateContent xmlns:mc="http://schemas.openxmlformats.org/markup-compatibility/2006">
-    <mc:Choice xmlns:p159="http://schemas.microsoft.com/office/powerpoint/2015/09/main" Requires="p159">
+  <mc:AlternateContent xmlns:mc="http://schemas.openxmlformats.org/markup-compatibility/2006" xmlns:p159="http://schemas.microsoft.com/office/powerpoint/2015/09/main">
+    <mc:Choice Requires="p159">
       <p:transition xmlns:p14="http://schemas.microsoft.com/office/powerpoint/2010/main" spd="slow" p14:dur="2000">
         <p159:morph option="byObject"/>
       </p:transition>
     </mc:Choice>
-    <mc:Fallback>
+    <mc:Fallback xmlns="">
       <p:transition spd="slow">
         <p:fade/>
       </p:transition>
@@ -18950,13 +18950,22 @@
               <a:buNone/>
             </a:pPr>
             <a:r>
+              <a:rPr lang="en" sz="1400">
+                <a:latin typeface="Roboto Condensed"/>
+                <a:ea typeface="Roboto Condensed"/>
+                <a:cs typeface="Roboto Condensed"/>
+                <a:sym typeface="Roboto Condensed"/>
+              </a:rPr>
+              <a:t>Como todo mundo, </a:t>
+            </a:r>
+            <a:r>
               <a:rPr lang="en" sz="1400" dirty="0">
                 <a:latin typeface="Roboto Condensed"/>
                 <a:ea typeface="Roboto Condensed"/>
                 <a:cs typeface="Roboto Condensed"/>
                 <a:sym typeface="Roboto Condensed"/>
               </a:rPr>
-              <a:t>Como toda criança, meu interesse começou na infância.</a:t>
+              <a:t>meu interesse começou na infância.</a:t>
             </a:r>
             <a:endParaRPr sz="1400" dirty="0"/>
           </a:p>
@@ -22181,13 +22190,13 @@
   <p:clrMapOvr>
     <a:masterClrMapping/>
   </p:clrMapOvr>
-  <mc:AlternateContent xmlns:mc="http://schemas.openxmlformats.org/markup-compatibility/2006">
-    <mc:Choice xmlns:p159="http://schemas.microsoft.com/office/powerpoint/2015/09/main" Requires="p159">
+  <mc:AlternateContent xmlns:mc="http://schemas.openxmlformats.org/markup-compatibility/2006" xmlns:p159="http://schemas.microsoft.com/office/powerpoint/2015/09/main">
+    <mc:Choice Requires="p159">
       <p:transition xmlns:p14="http://schemas.microsoft.com/office/powerpoint/2010/main" spd="slow" p14:dur="2000">
         <p159:morph option="byObject"/>
       </p:transition>
     </mc:Choice>
-    <mc:Fallback>
+    <mc:Fallback xmlns="">
       <p:transition spd="slow">
         <p:fade/>
       </p:transition>
@@ -22591,7 +22600,7 @@
                 <a:cs typeface="Roboto Condensed"/>
                 <a:sym typeface="Roboto Condensed"/>
               </a:rPr>
-              <a:t>Por meio de minhas ações, sendo como motivador as lições ensinadas, no qual ajudam no desenvolvimento pessoal.</a:t>
+              <a:t>Por meio de minhas ações, sendo como motivador, as lições ensinadas, no qual ajudaram no meu desenvolvimento pessoal.</a:t>
             </a:r>
             <a:endParaRPr sz="1400" dirty="0"/>
           </a:p>
@@ -26348,13 +26357,13 @@
   <p:clrMapOvr>
     <a:masterClrMapping/>
   </p:clrMapOvr>
-  <mc:AlternateContent xmlns:mc="http://schemas.openxmlformats.org/markup-compatibility/2006">
-    <mc:Choice xmlns:p159="http://schemas.microsoft.com/office/powerpoint/2015/09/main" Requires="p159">
+  <mc:AlternateContent xmlns:mc="http://schemas.openxmlformats.org/markup-compatibility/2006" xmlns:p159="http://schemas.microsoft.com/office/powerpoint/2015/09/main">
+    <mc:Choice Requires="p159">
       <p:transition xmlns:p14="http://schemas.microsoft.com/office/powerpoint/2010/main" spd="slow" p14:dur="2000">
         <p159:morph option="byObject"/>
       </p:transition>
     </mc:Choice>
-    <mc:Fallback>
+    <mc:Fallback xmlns="">
       <p:transition spd="slow">
         <p:fade/>
       </p:transition>
@@ -26871,13 +26880,13 @@
   <p:clrMapOvr>
     <a:masterClrMapping/>
   </p:clrMapOvr>
-  <mc:AlternateContent xmlns:mc="http://schemas.openxmlformats.org/markup-compatibility/2006">
-    <mc:Choice xmlns:p159="http://schemas.microsoft.com/office/powerpoint/2015/09/main" Requires="p159">
+  <mc:AlternateContent xmlns:mc="http://schemas.openxmlformats.org/markup-compatibility/2006" xmlns:p159="http://schemas.microsoft.com/office/powerpoint/2015/09/main">
+    <mc:Choice Requires="p159">
       <p:transition xmlns:p14="http://schemas.microsoft.com/office/powerpoint/2010/main" spd="slow" p14:dur="2000">
         <p159:morph option="byObject"/>
       </p:transition>
     </mc:Choice>
-    <mc:Fallback>
+    <mc:Fallback xmlns="">
       <p:transition spd="slow">
         <p:fade/>
       </p:transition>
@@ -28016,13 +28025,13 @@
   <p:clrMapOvr>
     <a:masterClrMapping/>
   </p:clrMapOvr>
-  <mc:AlternateContent xmlns:mc="http://schemas.openxmlformats.org/markup-compatibility/2006">
-    <mc:Choice xmlns:p159="http://schemas.microsoft.com/office/powerpoint/2015/09/main" Requires="p159">
+  <mc:AlternateContent xmlns:mc="http://schemas.openxmlformats.org/markup-compatibility/2006" xmlns:p159="http://schemas.microsoft.com/office/powerpoint/2015/09/main">
+    <mc:Choice Requires="p159">
       <p:transition xmlns:p14="http://schemas.microsoft.com/office/powerpoint/2010/main" spd="slow" p14:dur="2000">
         <p159:morph option="byObject"/>
       </p:transition>
     </mc:Choice>
-    <mc:Fallback>
+    <mc:Fallback xmlns="">
       <p:transition spd="slow">
         <p:fade/>
       </p:transition>
@@ -29292,13 +29301,13 @@
   <p:clrMapOvr>
     <a:masterClrMapping/>
   </p:clrMapOvr>
-  <mc:AlternateContent xmlns:mc="http://schemas.openxmlformats.org/markup-compatibility/2006">
-    <mc:Choice xmlns:p159="http://schemas.microsoft.com/office/powerpoint/2015/09/main" Requires="p159">
+  <mc:AlternateContent xmlns:mc="http://schemas.openxmlformats.org/markup-compatibility/2006" xmlns:p159="http://schemas.microsoft.com/office/powerpoint/2015/09/main">
+    <mc:Choice Requires="p159">
       <p:transition xmlns:p14="http://schemas.microsoft.com/office/powerpoint/2010/main" spd="slow" p14:dur="2000">
         <p159:morph option="byObject"/>
       </p:transition>
     </mc:Choice>
-    <mc:Fallback>
+    <mc:Fallback xmlns="">
       <p:transition spd="slow">
         <p:fade/>
       </p:transition>
@@ -39634,13 +39643,13 @@
   <p:clrMapOvr>
     <a:masterClrMapping/>
   </p:clrMapOvr>
-  <mc:AlternateContent xmlns:mc="http://schemas.openxmlformats.org/markup-compatibility/2006">
-    <mc:Choice xmlns:p159="http://schemas.microsoft.com/office/powerpoint/2015/09/main" Requires="p159">
+  <mc:AlternateContent xmlns:mc="http://schemas.openxmlformats.org/markup-compatibility/2006" xmlns:p159="http://schemas.microsoft.com/office/powerpoint/2015/09/main">
+    <mc:Choice Requires="p159">
       <p:transition xmlns:p14="http://schemas.microsoft.com/office/powerpoint/2010/main" spd="slow" p14:dur="2000">
         <p159:morph option="byObject"/>
       </p:transition>
     </mc:Choice>
-    <mc:Fallback>
+    <mc:Fallback xmlns="">
       <p:transition spd="slow">
         <p:fade/>
       </p:transition>
@@ -44959,13 +44968,13 @@
   <p:clrMapOvr>
     <a:masterClrMapping/>
   </p:clrMapOvr>
-  <mc:AlternateContent xmlns:mc="http://schemas.openxmlformats.org/markup-compatibility/2006">
-    <mc:Choice xmlns:p159="http://schemas.microsoft.com/office/powerpoint/2015/09/main" Requires="p159">
+  <mc:AlternateContent xmlns:mc="http://schemas.openxmlformats.org/markup-compatibility/2006" xmlns:p159="http://schemas.microsoft.com/office/powerpoint/2015/09/main">
+    <mc:Choice Requires="p159">
       <p:transition xmlns:p14="http://schemas.microsoft.com/office/powerpoint/2010/main" spd="slow" p14:dur="2000">
         <p159:morph option="byObject"/>
       </p:transition>
     </mc:Choice>
-    <mc:Fallback>
+    <mc:Fallback xmlns="">
       <p:transition spd="slow">
         <p:fade/>
       </p:transition>

</xml_diff>